<commit_message>
Update Spring Example project so that we use both XML and Annotations to configure our components.
</commit_message>
<xml_diff>
--- a/Documents/Week 6/RMI.pptx
+++ b/Documents/Week 6/RMI.pptx
@@ -203,7 +203,7 @@
             <a:fld id="{E613903A-B8B5-4602-B0B5-8C472DB8A55D}" type="datetimeFigureOut">
               <a:rPr lang="en-US" smtClean="0"/>
               <a:pPr/>
-              <a:t>4/2/2014</a:t>
+              <a:t>4/10/2014</a:t>
             </a:fld>
             <a:endParaRPr lang="en-NZ"/>
           </a:p>
@@ -367,7 +367,7 @@
             <a:fld id="{A8ADFD5B-A66C-449C-B6E8-FB716D07777D}" type="datetimeFigureOut">
               <a:rPr lang="en-US" smtClean="0"/>
               <a:pPr/>
-              <a:t>4/2/2014</a:t>
+              <a:t>4/10/2014</a:t>
             </a:fld>
             <a:endParaRPr lang="en-US"/>
           </a:p>
@@ -1744,7 +1744,7 @@
                 </a:solidFill>
               </a:rPr>
               <a:pPr algn="ctr"/>
-              <a:t>4/2/2014</a:t>
+              <a:t>4/10/2014</a:t>
             </a:fld>
             <a:endParaRPr lang="en-US" sz="2000" dirty="0">
               <a:solidFill>
@@ -2213,7 +2213,7 @@
             <a:fld id="{1AD18AD3-3CE8-43DF-9519-0CE09E5A5B13}" type="datetime1">
               <a:rPr lang="en-US" smtClean="0"/>
               <a:pPr/>
-              <a:t>4/2/2014</a:t>
+              <a:t>4/10/2014</a:t>
             </a:fld>
             <a:endParaRPr lang="en-US"/>
           </a:p>
@@ -2713,7 +2713,7 @@
             <a:fld id="{A4F74A13-0F99-4BDF-830A-2C64F08FBEA2}" type="datetime1">
               <a:rPr lang="en-US" smtClean="0"/>
               <a:pPr/>
-              <a:t>4/2/2014</a:t>
+              <a:t>4/10/2014</a:t>
             </a:fld>
             <a:endParaRPr lang="en-US"/>
           </a:p>
@@ -2977,7 +2977,7 @@
             <a:fld id="{AAD27745-9C0E-4338-8AE1-C73B2B0AE541}" type="datetime1">
               <a:rPr lang="en-US" smtClean="0"/>
               <a:pPr/>
-              <a:t>4/2/2014</a:t>
+              <a:t>4/10/2014</a:t>
             </a:fld>
             <a:endParaRPr lang="en-US"/>
           </a:p>
@@ -3233,7 +3233,7 @@
             <a:fld id="{AB7A63FC-A3AF-487E-B6EE-07AF4A4C83CD}" type="datetime1">
               <a:rPr lang="en-US" smtClean="0"/>
               <a:pPr/>
-              <a:t>4/2/2014</a:t>
+              <a:t>4/10/2014</a:t>
             </a:fld>
             <a:endParaRPr lang="en-US"/>
           </a:p>
@@ -3447,7 +3447,7 @@
             <a:fld id="{072F2C37-0788-4C48-A1F0-02CF2F89760A}" type="datetime1">
               <a:rPr lang="en-US" smtClean="0"/>
               <a:pPr/>
-              <a:t>4/2/2014</a:t>
+              <a:t>4/10/2014</a:t>
             </a:fld>
             <a:endParaRPr lang="en-US"/>
           </a:p>
@@ -3552,7 +3552,7 @@
             <a:fld id="{1971D7C2-ECDD-4253-A46B-5D73BD5CD815}" type="datetime1">
               <a:rPr lang="en-US" smtClean="0"/>
               <a:pPr/>
-              <a:t>4/2/2014</a:t>
+              <a:t>4/10/2014</a:t>
             </a:fld>
             <a:endParaRPr lang="en-US"/>
           </a:p>
@@ -3704,7 +3704,7 @@
             <a:fld id="{CE9E1F25-5926-42E7-9751-02D2D00C352F}" type="datetime1">
               <a:rPr lang="en-US" smtClean="0"/>
               <a:pPr/>
-              <a:t>4/2/2014</a:t>
+              <a:t>4/10/2014</a:t>
             </a:fld>
             <a:endParaRPr lang="en-US"/>
           </a:p>
@@ -4292,7 +4292,7 @@
             <a:fld id="{E3965B5F-D443-40C1-9BB4-E8FD76C1056C}" type="datetime1">
               <a:rPr lang="en-US" smtClean="0"/>
               <a:pPr/>
-              <a:t>4/2/2014</a:t>
+              <a:t>4/10/2014</a:t>
             </a:fld>
             <a:endParaRPr lang="en-US"/>
           </a:p>
@@ -4492,7 +4492,7 @@
             <a:fld id="{A9F4B5FD-BA4E-4BA2-81DF-2BA71E9EE121}" type="datetime1">
               <a:rPr lang="en-US" smtClean="0"/>
               <a:pPr/>
-              <a:t>4/2/2014</a:t>
+              <a:t>4/10/2014</a:t>
             </a:fld>
             <a:endParaRPr lang="en-US" sz="1400" dirty="0">
               <a:solidFill>
@@ -5146,7 +5146,7 @@
           <a:p>
             <a:r>
               <a:rPr lang="en-US" dirty="0" smtClean="0"/>
-              <a:t>Lecture 5 – Swing and RMI</a:t>
+              <a:t>RMI Remote Method Invocation</a:t>
             </a:r>
             <a:endParaRPr lang="en-US" dirty="0"/>
           </a:p>
@@ -5260,13 +5260,7 @@
               <a:rPr lang="en-NZ" sz="2400" dirty="0" smtClean="0">
                 <a:hlinkClick r:id="rId3"/>
               </a:rPr>
-              <a:t>http</a:t>
-            </a:r>
-            <a:r>
-              <a:rPr lang="en-NZ" sz="2400" dirty="0" smtClean="0">
-                <a:hlinkClick r:id="rId3"/>
-              </a:rPr>
-              <a:t>://docs.oracle.com/javase/tutorial/rmi/index.html</a:t>
+              <a:t>http://docs.oracle.com/javase/tutorial/rmi/index.html</a:t>
             </a:r>
             <a:endParaRPr lang="en-NZ" sz="2400" dirty="0" smtClean="0"/>
           </a:p>
@@ -5351,7 +5345,6 @@
               <a:rPr lang="en-NZ" dirty="0" smtClean="0"/>
               <a:t>RMI</a:t>
             </a:r>
-            <a:endParaRPr lang="en-NZ" dirty="0" smtClean="0"/>
           </a:p>
           <a:p>
             <a:r>
@@ -5473,15 +5466,7 @@
           <a:p>
             <a:r>
               <a:rPr lang="en-NZ" dirty="0" smtClean="0"/>
-              <a:t>A high level </a:t>
-            </a:r>
-            <a:r>
-              <a:rPr lang="en-NZ" dirty="0" smtClean="0"/>
-              <a:t>abstraction, </a:t>
-            </a:r>
-            <a:r>
-              <a:rPr lang="en-NZ" dirty="0" smtClean="0"/>
-              <a:t>do not need to worry about underlying protocol specifics</a:t>
+              <a:t>A high level abstraction, do not need to worry about underlying protocol specifics</a:t>
             </a:r>
           </a:p>
           <a:p>
@@ -5564,27 +5549,18 @@
               <a:rPr lang="en-NZ" dirty="0" smtClean="0"/>
               <a:t>Can communicate with non JVM servers using CORBA </a:t>
             </a:r>
-            <a:endParaRPr lang="en-NZ" dirty="0" smtClean="0"/>
           </a:p>
           <a:p>
             <a:pPr lvl="1"/>
             <a:r>
               <a:rPr lang="en-NZ" dirty="0" smtClean="0"/>
-              <a:t>Common </a:t>
-            </a:r>
+              <a:t>Common Object Request Broker Architecture</a:t>
+            </a:r>
+          </a:p>
+          <a:p>
             <a:r>
               <a:rPr lang="en-NZ" dirty="0" smtClean="0"/>
-              <a:t>Object Request Broker Architecture</a:t>
-            </a:r>
-          </a:p>
-          <a:p>
-            <a:r>
-              <a:rPr lang="en-NZ" dirty="0" smtClean="0"/>
-              <a:t>Developer </a:t>
-            </a:r>
-            <a:r>
-              <a:rPr lang="en-NZ" dirty="0" smtClean="0"/>
-              <a:t>defines an interface which both the client and server use</a:t>
+              <a:t>Developer defines an interface which both the client and server use</a:t>
             </a:r>
           </a:p>
           <a:p>
@@ -5596,11 +5572,7 @@
           <a:p>
             <a:r>
               <a:rPr lang="en-NZ" dirty="0" smtClean="0"/>
-              <a:t>RMI </a:t>
-            </a:r>
-            <a:r>
-              <a:rPr lang="en-NZ" dirty="0" smtClean="0"/>
-              <a:t>and </a:t>
+              <a:t>RMI and </a:t>
             </a:r>
             <a:r>
               <a:rPr lang="en-NZ" dirty="0" err="1" smtClean="0"/>

</xml_diff>